<commit_message>
Write a class for 1D FFT
</commit_message>
<xml_diff>
--- a/Fast Fourier Transform.pptx
+++ b/Fast Fourier Transform.pptx
@@ -17,7 +17,9 @@
     <p:sldId id="265" r:id="rId11"/>
     <p:sldId id="266" r:id="rId12"/>
     <p:sldId id="267" r:id="rId13"/>
-    <p:sldId id="268" r:id="rId14"/>
+    <p:sldId id="269" r:id="rId14"/>
+    <p:sldId id="270" r:id="rId15"/>
+    <p:sldId id="268" r:id="rId16"/>
   </p:sldIdLst>
   <p:sldSz cx="12192000" cy="6858000"/>
   <p:notesSz cx="6858000" cy="9144000"/>
@@ -255,7 +257,7 @@
           <a:p>
             <a:fld id="{F6108E14-C187-46E0-A2A4-C0243D906EDE}" type="datetimeFigureOut">
               <a:rPr lang="it-IT" smtClean="0"/>
-              <a:t>21/12/2022</a:t>
+              <a:t>22/12/2022</a:t>
             </a:fld>
             <a:endParaRPr lang="it-IT"/>
           </a:p>
@@ -425,7 +427,7 @@
           <a:p>
             <a:fld id="{F6108E14-C187-46E0-A2A4-C0243D906EDE}" type="datetimeFigureOut">
               <a:rPr lang="it-IT" smtClean="0"/>
-              <a:t>21/12/2022</a:t>
+              <a:t>22/12/2022</a:t>
             </a:fld>
             <a:endParaRPr lang="it-IT"/>
           </a:p>
@@ -605,7 +607,7 @@
           <a:p>
             <a:fld id="{F6108E14-C187-46E0-A2A4-C0243D906EDE}" type="datetimeFigureOut">
               <a:rPr lang="it-IT" smtClean="0"/>
-              <a:t>21/12/2022</a:t>
+              <a:t>22/12/2022</a:t>
             </a:fld>
             <a:endParaRPr lang="it-IT"/>
           </a:p>
@@ -775,7 +777,7 @@
           <a:p>
             <a:fld id="{F6108E14-C187-46E0-A2A4-C0243D906EDE}" type="datetimeFigureOut">
               <a:rPr lang="it-IT" smtClean="0"/>
-              <a:t>21/12/2022</a:t>
+              <a:t>22/12/2022</a:t>
             </a:fld>
             <a:endParaRPr lang="it-IT"/>
           </a:p>
@@ -1021,7 +1023,7 @@
           <a:p>
             <a:fld id="{F6108E14-C187-46E0-A2A4-C0243D906EDE}" type="datetimeFigureOut">
               <a:rPr lang="it-IT" smtClean="0"/>
-              <a:t>21/12/2022</a:t>
+              <a:t>22/12/2022</a:t>
             </a:fld>
             <a:endParaRPr lang="it-IT"/>
           </a:p>
@@ -1253,7 +1255,7 @@
           <a:p>
             <a:fld id="{F6108E14-C187-46E0-A2A4-C0243D906EDE}" type="datetimeFigureOut">
               <a:rPr lang="it-IT" smtClean="0"/>
-              <a:t>21/12/2022</a:t>
+              <a:t>22/12/2022</a:t>
             </a:fld>
             <a:endParaRPr lang="it-IT"/>
           </a:p>
@@ -1620,7 +1622,7 @@
           <a:p>
             <a:fld id="{F6108E14-C187-46E0-A2A4-C0243D906EDE}" type="datetimeFigureOut">
               <a:rPr lang="it-IT" smtClean="0"/>
-              <a:t>21/12/2022</a:t>
+              <a:t>22/12/2022</a:t>
             </a:fld>
             <a:endParaRPr lang="it-IT"/>
           </a:p>
@@ -1738,7 +1740,7 @@
           <a:p>
             <a:fld id="{F6108E14-C187-46E0-A2A4-C0243D906EDE}" type="datetimeFigureOut">
               <a:rPr lang="it-IT" smtClean="0"/>
-              <a:t>21/12/2022</a:t>
+              <a:t>22/12/2022</a:t>
             </a:fld>
             <a:endParaRPr lang="it-IT"/>
           </a:p>
@@ -1833,7 +1835,7 @@
           <a:p>
             <a:fld id="{F6108E14-C187-46E0-A2A4-C0243D906EDE}" type="datetimeFigureOut">
               <a:rPr lang="it-IT" smtClean="0"/>
-              <a:t>21/12/2022</a:t>
+              <a:t>22/12/2022</a:t>
             </a:fld>
             <a:endParaRPr lang="it-IT"/>
           </a:p>
@@ -2110,7 +2112,7 @@
           <a:p>
             <a:fld id="{F6108E14-C187-46E0-A2A4-C0243D906EDE}" type="datetimeFigureOut">
               <a:rPr lang="it-IT" smtClean="0"/>
-              <a:t>21/12/2022</a:t>
+              <a:t>22/12/2022</a:t>
             </a:fld>
             <a:endParaRPr lang="it-IT"/>
           </a:p>
@@ -2367,7 +2369,7 @@
           <a:p>
             <a:fld id="{F6108E14-C187-46E0-A2A4-C0243D906EDE}" type="datetimeFigureOut">
               <a:rPr lang="it-IT" smtClean="0"/>
-              <a:t>21/12/2022</a:t>
+              <a:t>22/12/2022</a:t>
             </a:fld>
             <a:endParaRPr lang="it-IT"/>
           </a:p>
@@ -2580,7 +2582,7 @@
           <a:p>
             <a:fld id="{F6108E14-C187-46E0-A2A4-C0243D906EDE}" type="datetimeFigureOut">
               <a:rPr lang="it-IT" smtClean="0"/>
-              <a:t>21/12/2022</a:t>
+              <a:t>22/12/2022</a:t>
             </a:fld>
             <a:endParaRPr lang="it-IT"/>
           </a:p>
@@ -3543,6 +3545,238 @@
 </file>
 
 <file path=ppt/slides/slide13.xml><?xml version="1.0" encoding="utf-8"?>
+<p:sld xmlns:a="http://schemas.openxmlformats.org/drawingml/2006/main" xmlns:r="http://schemas.openxmlformats.org/officeDocument/2006/relationships" xmlns:p="http://schemas.openxmlformats.org/presentationml/2006/main">
+  <p:cSld>
+    <p:spTree>
+      <p:nvGrpSpPr>
+        <p:cNvPr id="1" name=""/>
+        <p:cNvGrpSpPr/>
+        <p:nvPr/>
+      </p:nvGrpSpPr>
+      <p:grpSpPr>
+        <a:xfrm>
+          <a:off x="0" y="0"/>
+          <a:ext cx="0" cy="0"/>
+          <a:chOff x="0" y="0"/>
+          <a:chExt cx="0" cy="0"/>
+        </a:xfrm>
+      </p:grpSpPr>
+      <p:sp>
+        <p:nvSpPr>
+          <p:cNvPr id="4" name="Titolo 1">
+            <a:extLst>
+              <a:ext uri="{FF2B5EF4-FFF2-40B4-BE49-F238E27FC236}">
+                <a16:creationId xmlns:a16="http://schemas.microsoft.com/office/drawing/2014/main" id="{A5BE9672-3995-8373-B7CC-B79425393A77}"/>
+              </a:ext>
+            </a:extLst>
+          </p:cNvPr>
+          <p:cNvSpPr>
+            <a:spLocks noGrp="1"/>
+          </p:cNvSpPr>
+          <p:nvPr>
+            <p:ph type="title"/>
+          </p:nvPr>
+        </p:nvSpPr>
+        <p:spPr>
+          <a:xfrm>
+            <a:off x="1362323" y="2667400"/>
+            <a:ext cx="10515600" cy="1325563"/>
+          </a:xfrm>
+        </p:spPr>
+        <p:txBody>
+          <a:bodyPr/>
+          <a:lstStyle/>
+          <a:p>
+            <a:r>
+              <a:rPr lang="it-IT" dirty="0">
+                <a:solidFill>
+                  <a:srgbClr val="0070C0"/>
+                </a:solidFill>
+              </a:rPr>
+              <a:t>Inverse FFT</a:t>
+            </a:r>
+          </a:p>
+        </p:txBody>
+      </p:sp>
+      <p:pic>
+        <p:nvPicPr>
+          <p:cNvPr id="6" name="Immagine 5">
+            <a:extLst>
+              <a:ext uri="{FF2B5EF4-FFF2-40B4-BE49-F238E27FC236}">
+                <a16:creationId xmlns:a16="http://schemas.microsoft.com/office/drawing/2014/main" id="{BD0A7396-0725-6986-CD8C-5B29C4F3CFCB}"/>
+              </a:ext>
+            </a:extLst>
+          </p:cNvPr>
+          <p:cNvPicPr>
+            <a:picLocks noChangeAspect="1"/>
+          </p:cNvPicPr>
+          <p:nvPr/>
+        </p:nvPicPr>
+        <p:blipFill>
+          <a:blip r:embed="rId2"/>
+          <a:stretch>
+            <a:fillRect/>
+          </a:stretch>
+        </p:blipFill>
+        <p:spPr>
+          <a:xfrm>
+            <a:off x="6096000" y="167489"/>
+            <a:ext cx="4733677" cy="6325386"/>
+          </a:xfrm>
+          <a:prstGeom prst="rect">
+            <a:avLst/>
+          </a:prstGeom>
+        </p:spPr>
+      </p:pic>
+    </p:spTree>
+    <p:extLst>
+      <p:ext uri="{BB962C8B-B14F-4D97-AF65-F5344CB8AC3E}">
+        <p14:creationId xmlns:p14="http://schemas.microsoft.com/office/powerpoint/2010/main" val="121756153"/>
+      </p:ext>
+    </p:extLst>
+  </p:cSld>
+  <p:clrMapOvr>
+    <a:masterClrMapping/>
+  </p:clrMapOvr>
+</p:sld>
+</file>
+
+<file path=ppt/slides/slide14.xml><?xml version="1.0" encoding="utf-8"?>
+<p:sld xmlns:a="http://schemas.openxmlformats.org/drawingml/2006/main" xmlns:r="http://schemas.openxmlformats.org/officeDocument/2006/relationships" xmlns:p="http://schemas.openxmlformats.org/presentationml/2006/main">
+  <p:cSld>
+    <p:spTree>
+      <p:nvGrpSpPr>
+        <p:cNvPr id="1" name=""/>
+        <p:cNvGrpSpPr/>
+        <p:nvPr/>
+      </p:nvGrpSpPr>
+      <p:grpSpPr>
+        <a:xfrm>
+          <a:off x="0" y="0"/>
+          <a:ext cx="0" cy="0"/>
+          <a:chOff x="0" y="0"/>
+          <a:chExt cx="0" cy="0"/>
+        </a:xfrm>
+      </p:grpSpPr>
+      <p:sp>
+        <p:nvSpPr>
+          <p:cNvPr id="3" name="Segnaposto contenuto 2">
+            <a:extLst>
+              <a:ext uri="{FF2B5EF4-FFF2-40B4-BE49-F238E27FC236}">
+                <a16:creationId xmlns:a16="http://schemas.microsoft.com/office/drawing/2014/main" id="{EED80718-159E-8855-61FC-EC3AA65E8E6D}"/>
+              </a:ext>
+            </a:extLst>
+          </p:cNvPr>
+          <p:cNvSpPr>
+            <a:spLocks noGrp="1"/>
+          </p:cNvSpPr>
+          <p:nvPr>
+            <p:ph idx="1"/>
+          </p:nvPr>
+        </p:nvSpPr>
+        <p:spPr>
+          <a:xfrm>
+            <a:off x="0" y="2479249"/>
+            <a:ext cx="12196714" cy="4244468"/>
+          </a:xfrm>
+        </p:spPr>
+        <p:txBody>
+          <a:bodyPr/>
+          <a:lstStyle/>
+          <a:p>
+            <a:pPr marL="0" indent="0">
+              <a:buNone/>
+            </a:pPr>
+            <a:endParaRPr lang="it-IT" dirty="0"/>
+          </a:p>
+          <a:p>
+            <a:pPr marL="0" indent="0">
+              <a:buNone/>
+            </a:pPr>
+            <a:r>
+              <a:rPr lang="en-GB" sz="2700" dirty="0" err="1"/>
+              <a:t>mpic</a:t>
+            </a:r>
+            <a:r>
+              <a:rPr lang="en-GB" sz="2700" dirty="0"/>
+              <a:t>++ cooleytuck_parallel.cpp  -o </a:t>
+            </a:r>
+            <a:r>
+              <a:rPr lang="en-GB" sz="2700" dirty="0" err="1"/>
+              <a:t>cooleytucktuck_parallel</a:t>
+            </a:r>
+            <a:r>
+              <a:rPr lang="en-GB" sz="2700" dirty="0"/>
+              <a:t> -</a:t>
+            </a:r>
+            <a:r>
+              <a:rPr lang="en-GB" sz="2700" dirty="0" err="1"/>
+              <a:t>fopenmp</a:t>
+            </a:r>
+            <a:r>
+              <a:rPr lang="en-GB" sz="2700" dirty="0"/>
+              <a:t> -DTEST -DPRINT</a:t>
+            </a:r>
+          </a:p>
+          <a:p>
+            <a:pPr marL="0" indent="0">
+              <a:buNone/>
+            </a:pPr>
+            <a:endParaRPr lang="en-GB" dirty="0"/>
+          </a:p>
+        </p:txBody>
+      </p:sp>
+      <p:sp>
+        <p:nvSpPr>
+          <p:cNvPr id="4" name="Titolo 1">
+            <a:extLst>
+              <a:ext uri="{FF2B5EF4-FFF2-40B4-BE49-F238E27FC236}">
+                <a16:creationId xmlns:a16="http://schemas.microsoft.com/office/drawing/2014/main" id="{6C6A3797-0406-7AE0-EB28-642A6E18AFA8}"/>
+              </a:ext>
+            </a:extLst>
+          </p:cNvPr>
+          <p:cNvSpPr>
+            <a:spLocks noGrp="1"/>
+          </p:cNvSpPr>
+          <p:nvPr>
+            <p:ph type="title"/>
+          </p:nvPr>
+        </p:nvSpPr>
+        <p:spPr>
+          <a:xfrm>
+            <a:off x="640238" y="383978"/>
+            <a:ext cx="10515600" cy="1325563"/>
+          </a:xfrm>
+        </p:spPr>
+        <p:txBody>
+          <a:bodyPr/>
+          <a:lstStyle/>
+          <a:p>
+            <a:r>
+              <a:rPr lang="it-IT" dirty="0">
+                <a:solidFill>
+                  <a:srgbClr val="0070C0"/>
+                </a:solidFill>
+              </a:rPr>
+              <a:t>Compilation</a:t>
+            </a:r>
+          </a:p>
+        </p:txBody>
+      </p:sp>
+    </p:spTree>
+    <p:extLst>
+      <p:ext uri="{BB962C8B-B14F-4D97-AF65-F5344CB8AC3E}">
+        <p14:creationId xmlns:p14="http://schemas.microsoft.com/office/powerpoint/2010/main" val="1166112253"/>
+      </p:ext>
+    </p:extLst>
+  </p:cSld>
+  <p:clrMapOvr>
+    <a:masterClrMapping/>
+  </p:clrMapOvr>
+</p:sld>
+</file>
+
+<file path=ppt/slides/slide15.xml><?xml version="1.0" encoding="utf-8"?>
 <p:sld xmlns:a="http://schemas.openxmlformats.org/drawingml/2006/main" xmlns:r="http://schemas.openxmlformats.org/officeDocument/2006/relationships" xmlns:p="http://schemas.openxmlformats.org/presentationml/2006/main">
   <p:cSld>
     <p:spTree>

</xml_diff>